<commit_message>
Modified Solution-Listing.pptx-Added slide for servers-unified-computing
</commit_message>
<xml_diff>
--- a/docs/Solutionlisting/Solution-Listing.pptx
+++ b/docs/Solutionlisting/Solution-Listing.pptx
@@ -17,6 +17,7 @@
     <p:sldId id="266" r:id="rId11"/>
     <p:sldId id="267" r:id="rId12"/>
     <p:sldId id="268" r:id="rId13"/>
+    <p:sldId id="269" r:id="rId14"/>
   </p:sldIdLst>
   <p:sldSz cx="9144000" cy="6858000" type="screen4x3"/>
   <p:notesSz cx="6858000" cy="9144000"/>
@@ -117,7 +118,7 @@
   </p:defaultTextStyle>
   <p:extLst>
     <p:ext uri="{EFAFB233-063F-42B5-8137-9DF3F51BA10A}">
-      <p15:sldGuideLst xmlns:p15="http://schemas.microsoft.com/office/powerpoint/2012/main">
+      <p15:sldGuideLst xmlns:p15="http://schemas.microsoft.com/office/powerpoint/2012/main" xmlns="">
         <p15:guide id="1" orient="horz" pos="2160">
           <p15:clr>
             <a:srgbClr val="A4A3A4"/>
@@ -315,7 +316,7 @@
           <a:p>
             <a:fld id="{D74C6324-722D-4D95-B86E-E5CAF4707918}" type="datetimeFigureOut">
               <a:rPr lang="en-US" smtClean="0"/>
-              <a:t>11/18/2015</a:t>
+              <a:t>12/3/2015</a:t>
             </a:fld>
             <a:endParaRPr lang="en-US"/>
           </a:p>
@@ -485,7 +486,7 @@
           <a:p>
             <a:fld id="{D74C6324-722D-4D95-B86E-E5CAF4707918}" type="datetimeFigureOut">
               <a:rPr lang="en-US" smtClean="0"/>
-              <a:t>11/18/2015</a:t>
+              <a:t>12/3/2015</a:t>
             </a:fld>
             <a:endParaRPr lang="en-US"/>
           </a:p>
@@ -665,7 +666,7 @@
           <a:p>
             <a:fld id="{D74C6324-722D-4D95-B86E-E5CAF4707918}" type="datetimeFigureOut">
               <a:rPr lang="en-US" smtClean="0"/>
-              <a:t>11/18/2015</a:t>
+              <a:t>12/3/2015</a:t>
             </a:fld>
             <a:endParaRPr lang="en-US"/>
           </a:p>
@@ -835,7 +836,7 @@
           <a:p>
             <a:fld id="{D74C6324-722D-4D95-B86E-E5CAF4707918}" type="datetimeFigureOut">
               <a:rPr lang="en-US" smtClean="0"/>
-              <a:t>11/18/2015</a:t>
+              <a:t>12/3/2015</a:t>
             </a:fld>
             <a:endParaRPr lang="en-US"/>
           </a:p>
@@ -1081,7 +1082,7 @@
           <a:p>
             <a:fld id="{D74C6324-722D-4D95-B86E-E5CAF4707918}" type="datetimeFigureOut">
               <a:rPr lang="en-US" smtClean="0"/>
-              <a:t>11/18/2015</a:t>
+              <a:t>12/3/2015</a:t>
             </a:fld>
             <a:endParaRPr lang="en-US"/>
           </a:p>
@@ -1369,7 +1370,7 @@
           <a:p>
             <a:fld id="{D74C6324-722D-4D95-B86E-E5CAF4707918}" type="datetimeFigureOut">
               <a:rPr lang="en-US" smtClean="0"/>
-              <a:t>11/18/2015</a:t>
+              <a:t>12/3/2015</a:t>
             </a:fld>
             <a:endParaRPr lang="en-US"/>
           </a:p>
@@ -1791,7 +1792,7 @@
           <a:p>
             <a:fld id="{D74C6324-722D-4D95-B86E-E5CAF4707918}" type="datetimeFigureOut">
               <a:rPr lang="en-US" smtClean="0"/>
-              <a:t>11/18/2015</a:t>
+              <a:t>12/3/2015</a:t>
             </a:fld>
             <a:endParaRPr lang="en-US"/>
           </a:p>
@@ -1909,7 +1910,7 @@
           <a:p>
             <a:fld id="{D74C6324-722D-4D95-B86E-E5CAF4707918}" type="datetimeFigureOut">
               <a:rPr lang="en-US" smtClean="0"/>
-              <a:t>11/18/2015</a:t>
+              <a:t>12/3/2015</a:t>
             </a:fld>
             <a:endParaRPr lang="en-US"/>
           </a:p>
@@ -2004,7 +2005,7 @@
           <a:p>
             <a:fld id="{D74C6324-722D-4D95-B86E-E5CAF4707918}" type="datetimeFigureOut">
               <a:rPr lang="en-US" smtClean="0"/>
-              <a:t>11/18/2015</a:t>
+              <a:t>12/3/2015</a:t>
             </a:fld>
             <a:endParaRPr lang="en-US"/>
           </a:p>
@@ -2281,7 +2282,7 @@
           <a:p>
             <a:fld id="{D74C6324-722D-4D95-B86E-E5CAF4707918}" type="datetimeFigureOut">
               <a:rPr lang="en-US" smtClean="0"/>
-              <a:t>11/18/2015</a:t>
+              <a:t>12/3/2015</a:t>
             </a:fld>
             <a:endParaRPr lang="en-US"/>
           </a:p>
@@ -2534,7 +2535,7 @@
           <a:p>
             <a:fld id="{D74C6324-722D-4D95-B86E-E5CAF4707918}" type="datetimeFigureOut">
               <a:rPr lang="en-US" smtClean="0"/>
-              <a:t>11/18/2015</a:t>
+              <a:t>12/3/2015</a:t>
             </a:fld>
             <a:endParaRPr lang="en-US"/>
           </a:p>
@@ -2747,7 +2748,7 @@
           <a:p>
             <a:fld id="{D74C6324-722D-4D95-B86E-E5CAF4707918}" type="datetimeFigureOut">
               <a:rPr lang="en-US" smtClean="0"/>
-              <a:t>11/18/2015</a:t>
+              <a:t>12/3/2015</a:t>
             </a:fld>
             <a:endParaRPr lang="en-US"/>
           </a:p>
@@ -3347,7 +3348,6 @@
               <a:rPr lang="en-US" sz="3600" dirty="0"/>
               <a:t>9</a:t>
             </a:r>
-            <a:endParaRPr lang="en-US" sz="3600" dirty="0"/>
           </a:p>
         </p:txBody>
       </p:sp>
@@ -3728,6 +3728,144 @@
 </p:sld>
 </file>
 
+<file path=ppt/slides/slide13.xml><?xml version="1.0" encoding="utf-8"?>
+<p:sld xmlns:a="http://schemas.openxmlformats.org/drawingml/2006/main" xmlns:r="http://schemas.openxmlformats.org/officeDocument/2006/relationships" xmlns:p="http://schemas.openxmlformats.org/presentationml/2006/main">
+  <p:cSld>
+    <p:spTree>
+      <p:nvGrpSpPr>
+        <p:cNvPr id="1" name=""/>
+        <p:cNvGrpSpPr/>
+        <p:nvPr/>
+      </p:nvGrpSpPr>
+      <p:grpSpPr>
+        <a:xfrm>
+          <a:off x="0" y="0"/>
+          <a:ext cx="0" cy="0"/>
+          <a:chOff x="0" y="0"/>
+          <a:chExt cx="0" cy="0"/>
+        </a:xfrm>
+      </p:grpSpPr>
+      <p:sp>
+        <p:nvSpPr>
+          <p:cNvPr id="10" name="TextBox 9"/>
+          <p:cNvSpPr txBox="1"/>
+          <p:nvPr/>
+        </p:nvSpPr>
+        <p:spPr>
+          <a:xfrm>
+            <a:off x="296887" y="152400"/>
+            <a:ext cx="6637313" cy="738664"/>
+          </a:xfrm>
+          <a:prstGeom prst="rect">
+            <a:avLst/>
+          </a:prstGeom>
+          <a:noFill/>
+        </p:spPr>
+        <p:txBody>
+          <a:bodyPr wrap="square" rtlCol="0">
+            <a:spAutoFit/>
+          </a:bodyPr>
+          <a:lstStyle/>
+          <a:p>
+            <a:r>
+              <a:rPr lang="en-US" sz="1400" b="1" dirty="0" smtClean="0">
+                <a:hlinkClick r:id="rId2"/>
+              </a:rPr>
+              <a:t>http</a:t>
+            </a:r>
+            <a:r>
+              <a:rPr lang="en-US" sz="1400" b="1" dirty="0">
+                <a:hlinkClick r:id="rId2"/>
+              </a:rPr>
+              <a:t>://</a:t>
+            </a:r>
+            <a:r>
+              <a:rPr lang="en-US" sz="1400" b="1" dirty="0" smtClean="0">
+                <a:hlinkClick r:id="rId2"/>
+              </a:rPr>
+              <a:t>www.cisco.com/c/en/us/products/servers-unified-computing/solution-listing.html</a:t>
+            </a:r>
+            <a:endParaRPr lang="en-US" sz="1400" b="1" dirty="0" smtClean="0"/>
+          </a:p>
+          <a:p>
+            <a:endParaRPr lang="en-US" sz="1400" b="1" dirty="0"/>
+          </a:p>
+        </p:txBody>
+      </p:sp>
+      <p:pic>
+        <p:nvPicPr>
+          <p:cNvPr id="1027" name="Picture 3"/>
+          <p:cNvPicPr>
+            <a:picLocks noChangeAspect="1" noChangeArrowheads="1"/>
+          </p:cNvPicPr>
+          <p:nvPr/>
+        </p:nvPicPr>
+        <p:blipFill>
+          <a:blip r:embed="rId3">
+            <a:extLst>
+              <a:ext uri="{28A0092B-C50C-407E-A947-70E740481C1C}">
+                <a14:useLocalDpi xmlns:a14="http://schemas.microsoft.com/office/drawing/2010/main" val="0"/>
+              </a:ext>
+            </a:extLst>
+          </a:blip>
+          <a:srcRect/>
+          <a:stretch>
+            <a:fillRect/>
+          </a:stretch>
+        </p:blipFill>
+        <p:spPr bwMode="auto">
+          <a:xfrm>
+            <a:off x="246063" y="990600"/>
+            <a:ext cx="8651875" cy="5224463"/>
+          </a:xfrm>
+          <a:prstGeom prst="rect">
+            <a:avLst/>
+          </a:prstGeom>
+          <a:noFill/>
+          <a:ln>
+            <a:noFill/>
+          </a:ln>
+          <a:extLst>
+            <a:ext uri="{909E8E84-426E-40DD-AFC4-6F175D3DCCD1}">
+              <a14:hiddenFill xmlns:a14="http://schemas.microsoft.com/office/drawing/2010/main">
+                <a:solidFill>
+                  <a:schemeClr val="accent1"/>
+                </a:solidFill>
+              </a14:hiddenFill>
+            </a:ext>
+            <a:ext uri="{91240B29-F687-4F45-9708-019B960494DF}">
+              <a14:hiddenLine xmlns:a14="http://schemas.microsoft.com/office/drawing/2010/main" w="9525">
+                <a:solidFill>
+                  <a:schemeClr val="tx1"/>
+                </a:solidFill>
+                <a:miter lim="800000"/>
+                <a:headEnd/>
+                <a:tailEnd/>
+              </a14:hiddenLine>
+            </a:ext>
+          </a:extLst>
+        </p:spPr>
+      </p:pic>
+    </p:spTree>
+    <p:extLst>
+      <p:ext uri="{BB962C8B-B14F-4D97-AF65-F5344CB8AC3E}">
+        <p14:creationId xmlns:p14="http://schemas.microsoft.com/office/powerpoint/2010/main" val="3559486523"/>
+      </p:ext>
+    </p:extLst>
+  </p:cSld>
+  <p:clrMapOvr>
+    <a:masterClrMapping/>
+  </p:clrMapOvr>
+  <p:timing>
+    <p:tnLst>
+      <p:par>
+        <p:cTn id="1" dur="indefinite" restart="never" nodeType="tmRoot"/>
+      </p:par>
+    </p:tnLst>
+  </p:timing>
+</p:sld>
+</file>
+
 <file path=ppt/slides/slide2.xml><?xml version="1.0" encoding="utf-8"?>
 <p:sld xmlns:a="http://schemas.openxmlformats.org/drawingml/2006/main" xmlns:r="http://schemas.openxmlformats.org/officeDocument/2006/relationships" xmlns:p="http://schemas.openxmlformats.org/presentationml/2006/main">
   <p:cSld>
@@ -3754,7 +3892,7 @@
         <p:spPr>
           <a:xfrm>
             <a:off x="296887" y="152400"/>
-            <a:ext cx="6637313" cy="954107"/>
+            <a:ext cx="6637313" cy="738664"/>
           </a:xfrm>
           <a:prstGeom prst="rect">
             <a:avLst/>
@@ -3782,18 +3920,6 @@
             <a:endParaRPr lang="en-US" sz="1400" b="1" dirty="0" smtClean="0"/>
           </a:p>
           <a:p>
-            <a:r>
-              <a:rPr lang="en-US" sz="1400" b="1" dirty="0">
-                <a:hlinkClick r:id="rId3"/>
-              </a:rPr>
-              <a:t>http://</a:t>
-            </a:r>
-            <a:r>
-              <a:rPr lang="en-US" sz="1400" b="1" dirty="0" smtClean="0">
-                <a:hlinkClick r:id="rId3"/>
-              </a:rPr>
-              <a:t>www.cisco.com/c/en/us/products/servers-unified-computing/solution-listing.html</a:t>
-            </a:r>
             <a:endParaRPr lang="en-US" sz="1400" b="1" dirty="0" smtClean="0"/>
           </a:p>
           <a:p>
@@ -3810,7 +3936,7 @@
           <p:nvPr/>
         </p:nvPicPr>
         <p:blipFill>
-          <a:blip r:embed="rId4">
+          <a:blip r:embed="rId3">
             <a:extLst>
               <a:ext uri="{28A0092B-C50C-407E-A947-70E740481C1C}">
                 <a14:useLocalDpi xmlns:a14="http://schemas.microsoft.com/office/drawing/2010/main" val="0"/>
@@ -4484,11 +4610,7 @@
           <a:p>
             <a:r>
               <a:rPr lang="en-US" sz="2800" dirty="0" smtClean="0"/>
-              <a:t>Html deviation for template for slide </a:t>
-            </a:r>
-            <a:r>
-              <a:rPr lang="en-US" sz="2800" dirty="0" smtClean="0"/>
-              <a:t>6</a:t>
+              <a:t>Html deviation for template for slide 6</a:t>
             </a:r>
             <a:endParaRPr lang="en-US" sz="2800" dirty="0"/>
           </a:p>

</xml_diff>